<commit_message>
Replaced oral check with practical asssessment in slide 1
</commit_message>
<xml_diff>
--- a/Slides/Unit 1 - Intro, array, complexity.pptx
+++ b/Slides/Unit 1 - Intro, array, complexity.pptx
@@ -251,7 +251,7 @@
           <a:p>
             <a:fld id="{F314420D-16BA-4EDC-9A71-800590EAD5A3}" type="datetimeFigureOut">
               <a:rPr lang="en-GB" smtClean="0"/>
-              <a:t>14/11/2016</a:t>
+              <a:t>15/11/2016</a:t>
             </a:fld>
             <a:endParaRPr lang="en-GB"/>
           </a:p>
@@ -1526,7 +1526,7 @@
           <a:p>
             <a:fld id="{18C26D5F-E074-46D4-9D12-EC6FA35BF351}" type="datetime1">
               <a:rPr lang="en-GB" smtClean="0"/>
-              <a:t>14/11/2016</a:t>
+              <a:t>15/11/2016</a:t>
             </a:fld>
             <a:endParaRPr lang="en-GB"/>
           </a:p>
@@ -1781,7 +1781,7 @@
           <a:p>
             <a:fld id="{4B35C3FA-0131-431B-A414-405AEA1D2A71}" type="datetime1">
               <a:rPr lang="en-GB" smtClean="0"/>
-              <a:t>14/11/2016</a:t>
+              <a:t>15/11/2016</a:t>
             </a:fld>
             <a:endParaRPr lang="en-GB"/>
           </a:p>
@@ -2099,7 +2099,7 @@
           <a:p>
             <a:fld id="{49981D9B-F685-4349-A8A2-2CE7B878EB5A}" type="datetime1">
               <a:rPr lang="en-GB" smtClean="0"/>
-              <a:t>14/11/2016</a:t>
+              <a:t>15/11/2016</a:t>
             </a:fld>
             <a:endParaRPr lang="en-GB"/>
           </a:p>
@@ -2430,7 +2430,7 @@
           <a:p>
             <a:fld id="{3760A31A-2117-43EC-98BD-D093B4BEBF7D}" type="datetime1">
               <a:rPr lang="en-GB" smtClean="0"/>
-              <a:t>14/11/2016</a:t>
+              <a:t>15/11/2016</a:t>
             </a:fld>
             <a:endParaRPr lang="en-GB"/>
           </a:p>
@@ -2748,7 +2748,7 @@
           <a:p>
             <a:fld id="{C6E16212-41E4-4C8C-BA02-AE66F4F32210}" type="datetime1">
               <a:rPr lang="en-GB" smtClean="0"/>
-              <a:t>14/11/2016</a:t>
+              <a:t>15/11/2016</a:t>
             </a:fld>
             <a:endParaRPr lang="en-GB"/>
           </a:p>
@@ -3139,7 +3139,7 @@
           <a:p>
             <a:fld id="{0519352D-B0C8-4AC5-B195-10F5559BB262}" type="datetime1">
               <a:rPr lang="en-GB" smtClean="0"/>
-              <a:t>14/11/2016</a:t>
+              <a:t>15/11/2016</a:t>
             </a:fld>
             <a:endParaRPr lang="en-GB"/>
           </a:p>
@@ -3313,7 +3313,7 @@
           <a:p>
             <a:fld id="{05D599E2-E77F-4890-BE0A-B738A12350D6}" type="datetime1">
               <a:rPr lang="en-GB" smtClean="0"/>
-              <a:t>14/11/2016</a:t>
+              <a:t>15/11/2016</a:t>
             </a:fld>
             <a:endParaRPr lang="en-GB"/>
           </a:p>
@@ -3497,7 +3497,7 @@
           <a:p>
             <a:fld id="{DCD5088B-EE31-4F65-88C6-15B4DF01B231}" type="datetime1">
               <a:rPr lang="en-GB" smtClean="0"/>
-              <a:t>14/11/2016</a:t>
+              <a:t>15/11/2016</a:t>
             </a:fld>
             <a:endParaRPr lang="en-GB"/>
           </a:p>
@@ -3671,7 +3671,7 @@
           <a:p>
             <a:fld id="{1DB60045-9CB0-4227-8117-FFD6333F886B}" type="datetime1">
               <a:rPr lang="en-GB" smtClean="0"/>
-              <a:t>14/11/2016</a:t>
+              <a:t>15/11/2016</a:t>
             </a:fld>
             <a:endParaRPr lang="en-GB"/>
           </a:p>
@@ -3922,7 +3922,7 @@
           <a:p>
             <a:fld id="{D5CF92DE-63B8-42F8-A53F-ECC5223B8745}" type="datetime1">
               <a:rPr lang="en-GB" smtClean="0"/>
-              <a:t>14/11/2016</a:t>
+              <a:t>15/11/2016</a:t>
             </a:fld>
             <a:endParaRPr lang="en-GB"/>
           </a:p>
@@ -4158,7 +4158,7 @@
           <a:p>
             <a:fld id="{20250C1C-B33B-43A1-AE82-8E9E7DB20D73}" type="datetime1">
               <a:rPr lang="en-GB" smtClean="0"/>
-              <a:t>14/11/2016</a:t>
+              <a:t>15/11/2016</a:t>
             </a:fld>
             <a:endParaRPr lang="en-GB"/>
           </a:p>
@@ -4536,7 +4536,7 @@
           <a:p>
             <a:fld id="{58DE2235-6AA8-47F5-9D01-0948564962B0}" type="datetime1">
               <a:rPr lang="en-GB" smtClean="0"/>
-              <a:t>14/11/2016</a:t>
+              <a:t>15/11/2016</a:t>
             </a:fld>
             <a:endParaRPr lang="en-GB"/>
           </a:p>
@@ -4663,7 +4663,7 @@
           <a:p>
             <a:fld id="{C2B82BCC-7656-4FB8-8817-2D2523193143}" type="datetime1">
               <a:rPr lang="en-GB" smtClean="0"/>
-              <a:t>14/11/2016</a:t>
+              <a:t>15/11/2016</a:t>
             </a:fld>
             <a:endParaRPr lang="en-GB"/>
           </a:p>
@@ -4762,7 +4762,7 @@
           <a:p>
             <a:fld id="{E9B1E5CC-C158-4334-AC93-866E1D089CE6}" type="datetime1">
               <a:rPr lang="en-GB" smtClean="0"/>
-              <a:t>14/11/2016</a:t>
+              <a:t>15/11/2016</a:t>
             </a:fld>
             <a:endParaRPr lang="en-GB"/>
           </a:p>
@@ -5021,7 +5021,7 @@
           <a:p>
             <a:fld id="{1805CE10-4221-45AA-9C81-C847F07AE64E}" type="datetime1">
               <a:rPr lang="en-GB" smtClean="0"/>
-              <a:t>14/11/2016</a:t>
+              <a:t>15/11/2016</a:t>
             </a:fld>
             <a:endParaRPr lang="en-GB"/>
           </a:p>
@@ -5288,7 +5288,7 @@
           <a:p>
             <a:fld id="{9CE42FBE-B2C0-4C85-902B-8B67FAA3BF59}" type="datetime1">
               <a:rPr lang="en-GB" smtClean="0"/>
-              <a:t>14/11/2016</a:t>
+              <a:t>15/11/2016</a:t>
             </a:fld>
             <a:endParaRPr lang="en-GB"/>
           </a:p>
@@ -6037,7 +6037,7 @@
           <a:p>
             <a:fld id="{ED97A32C-9E02-42E1-B012-E07621DB64D9}" type="datetime1">
               <a:rPr lang="en-GB" smtClean="0"/>
-              <a:t>14/11/2016</a:t>
+              <a:t>15/11/2016</a:t>
             </a:fld>
             <a:endParaRPr lang="en-GB"/>
           </a:p>
@@ -18726,8 +18726,8 @@
           </a:p>
         </p:txBody>
       </p:sp>
-      <mc:AlternateContent xmlns:mc="http://schemas.openxmlformats.org/markup-compatibility/2006" xmlns:a14="http://schemas.microsoft.com/office/drawing/2010/main">
-        <mc:Choice Requires="a14">
+      <mc:AlternateContent xmlns:mc="http://schemas.openxmlformats.org/markup-compatibility/2006">
+        <mc:Choice xmlns:a14="http://schemas.microsoft.com/office/drawing/2010/main" Requires="a14">
           <p:sp>
             <p:nvSpPr>
               <p:cNvPr id="3" name="Content Placeholder 2"/>
@@ -18841,8 +18841,12 @@
               <a:p>
                 <a:pPr lvl="2"/>
                 <a:r>
+                  <a:rPr lang="en-GB"/>
+                  <a:t>Practical assessment </a:t>
+                </a:r>
+                <a:r>
                   <a:rPr lang="en-GB" dirty="0"/>
-                  <a:t>Oral checks to verify authorship of code</a:t>
+                  <a:t>to verify authorship of code</a:t>
                 </a:r>
               </a:p>
               <a:p>
@@ -18855,7 +18859,7 @@
             </p:txBody>
           </p:sp>
         </mc:Choice>
-        <mc:Fallback xmlns="">
+        <mc:Fallback>
           <p:sp>
             <p:nvSpPr>
               <p:cNvPr id="3" name="Content Placeholder 2"/>
@@ -18883,7 +18887,7 @@
               <a:lstStyle/>
               <a:p>
                 <a:r>
-                  <a:rPr lang="en-GB">
+                  <a:rPr lang="it-IT">
                     <a:noFill/>
                   </a:rPr>
                   <a:t> </a:t>

</xml_diff>